<commit_message>
Intro Videos and 4.5-4.6
Updated intro videos for chapters 1-7. Also split section equivalent point load into multiple sections.
</commit_message>
<xml_diff>
--- a/Lecture Slides/IntroSlides/2_Intro.pptx
+++ b/Lecture Slides/IntroSlides/2_Intro.pptx
@@ -104,6 +104,11 @@
       </a:defRPr>
     </a:lvl9pPr>
   </p:defaultTextStyle>
+  <p:extLst>
+    <p:ext uri="{EFAFB233-063F-42B5-8137-9DF3F51BA10A}">
+      <p15:sldGuideLst xmlns:p15="http://schemas.microsoft.com/office/powerpoint/2012/main"/>
+    </p:ext>
+  </p:extLst>
 </p:presentation>
 </file>
 
@@ -149,10 +154,9 @@
           </a:lstStyle>
           <a:p>
             <a:r>
-              <a:rPr lang="en-US" smtClean="0"/>
+              <a:rPr lang="en-US"/>
               <a:t>Click to edit Master title style</a:t>
             </a:r>
-            <a:endParaRPr lang="en-US"/>
           </a:p>
         </p:txBody>
       </p:sp>
@@ -214,10 +218,9 @@
           </a:lstStyle>
           <a:p>
             <a:r>
-              <a:rPr lang="en-US" smtClean="0"/>
+              <a:rPr lang="en-US"/>
               <a:t>Click to edit Master subtitle style</a:t>
             </a:r>
-            <a:endParaRPr lang="en-US"/>
           </a:p>
         </p:txBody>
       </p:sp>
@@ -238,7 +241,7 @@
           <a:p>
             <a:fld id="{AA15078D-9DE8-47D0-8F0F-AA243E1A2060}" type="datetimeFigureOut">
               <a:rPr lang="en-US" smtClean="0"/>
-              <a:t>8/3/2017</a:t>
+              <a:t>6/10/2022</a:t>
             </a:fld>
             <a:endParaRPr lang="en-US"/>
           </a:p>
@@ -332,10 +335,9 @@
           <a:lstStyle/>
           <a:p>
             <a:r>
-              <a:rPr lang="en-US" smtClean="0"/>
+              <a:rPr lang="en-US"/>
               <a:t>Click to edit Master title style</a:t>
             </a:r>
-            <a:endParaRPr lang="en-US"/>
           </a:p>
         </p:txBody>
       </p:sp>
@@ -356,38 +358,37 @@
           <a:p>
             <a:pPr lvl="0"/>
             <a:r>
-              <a:rPr lang="en-US" smtClean="0"/>
+              <a:rPr lang="en-US"/>
               <a:t>Edit Master text styles</a:t>
             </a:r>
           </a:p>
           <a:p>
             <a:pPr lvl="1"/>
             <a:r>
-              <a:rPr lang="en-US" smtClean="0"/>
+              <a:rPr lang="en-US"/>
               <a:t>Second level</a:t>
             </a:r>
           </a:p>
           <a:p>
             <a:pPr lvl="2"/>
             <a:r>
-              <a:rPr lang="en-US" smtClean="0"/>
+              <a:rPr lang="en-US"/>
               <a:t>Third level</a:t>
             </a:r>
           </a:p>
           <a:p>
             <a:pPr lvl="3"/>
             <a:r>
-              <a:rPr lang="en-US" smtClean="0"/>
+              <a:rPr lang="en-US"/>
               <a:t>Fourth level</a:t>
             </a:r>
           </a:p>
           <a:p>
             <a:pPr lvl="4"/>
             <a:r>
-              <a:rPr lang="en-US" smtClean="0"/>
+              <a:rPr lang="en-US"/>
               <a:t>Fifth level</a:t>
             </a:r>
-            <a:endParaRPr lang="en-US"/>
           </a:p>
         </p:txBody>
       </p:sp>
@@ -408,7 +409,7 @@
           <a:p>
             <a:fld id="{AA15078D-9DE8-47D0-8F0F-AA243E1A2060}" type="datetimeFigureOut">
               <a:rPr lang="en-US" smtClean="0"/>
-              <a:t>8/3/2017</a:t>
+              <a:t>6/10/2022</a:t>
             </a:fld>
             <a:endParaRPr lang="en-US"/>
           </a:p>
@@ -507,10 +508,9 @@
           <a:lstStyle/>
           <a:p>
             <a:r>
-              <a:rPr lang="en-US" smtClean="0"/>
+              <a:rPr lang="en-US"/>
               <a:t>Click to edit Master title style</a:t>
             </a:r>
-            <a:endParaRPr lang="en-US"/>
           </a:p>
         </p:txBody>
       </p:sp>
@@ -536,38 +536,37 @@
           <a:p>
             <a:pPr lvl="0"/>
             <a:r>
-              <a:rPr lang="en-US" smtClean="0"/>
+              <a:rPr lang="en-US"/>
               <a:t>Edit Master text styles</a:t>
             </a:r>
           </a:p>
           <a:p>
             <a:pPr lvl="1"/>
             <a:r>
-              <a:rPr lang="en-US" smtClean="0"/>
+              <a:rPr lang="en-US"/>
               <a:t>Second level</a:t>
             </a:r>
           </a:p>
           <a:p>
             <a:pPr lvl="2"/>
             <a:r>
-              <a:rPr lang="en-US" smtClean="0"/>
+              <a:rPr lang="en-US"/>
               <a:t>Third level</a:t>
             </a:r>
           </a:p>
           <a:p>
             <a:pPr lvl="3"/>
             <a:r>
-              <a:rPr lang="en-US" smtClean="0"/>
+              <a:rPr lang="en-US"/>
               <a:t>Fourth level</a:t>
             </a:r>
           </a:p>
           <a:p>
             <a:pPr lvl="4"/>
             <a:r>
-              <a:rPr lang="en-US" smtClean="0"/>
+              <a:rPr lang="en-US"/>
               <a:t>Fifth level</a:t>
             </a:r>
-            <a:endParaRPr lang="en-US"/>
           </a:p>
         </p:txBody>
       </p:sp>
@@ -588,7 +587,7 @@
           <a:p>
             <a:fld id="{AA15078D-9DE8-47D0-8F0F-AA243E1A2060}" type="datetimeFigureOut">
               <a:rPr lang="en-US" smtClean="0"/>
-              <a:t>8/3/2017</a:t>
+              <a:t>6/10/2022</a:t>
             </a:fld>
             <a:endParaRPr lang="en-US"/>
           </a:p>
@@ -682,10 +681,9 @@
           <a:lstStyle/>
           <a:p>
             <a:r>
-              <a:rPr lang="en-US" smtClean="0"/>
+              <a:rPr lang="en-US"/>
               <a:t>Click to edit Master title style</a:t>
             </a:r>
-            <a:endParaRPr lang="en-US"/>
           </a:p>
         </p:txBody>
       </p:sp>
@@ -706,38 +704,37 @@
           <a:p>
             <a:pPr lvl="0"/>
             <a:r>
-              <a:rPr lang="en-US" smtClean="0"/>
+              <a:rPr lang="en-US"/>
               <a:t>Edit Master text styles</a:t>
             </a:r>
           </a:p>
           <a:p>
             <a:pPr lvl="1"/>
             <a:r>
-              <a:rPr lang="en-US" smtClean="0"/>
+              <a:rPr lang="en-US"/>
               <a:t>Second level</a:t>
             </a:r>
           </a:p>
           <a:p>
             <a:pPr lvl="2"/>
             <a:r>
-              <a:rPr lang="en-US" smtClean="0"/>
+              <a:rPr lang="en-US"/>
               <a:t>Third level</a:t>
             </a:r>
           </a:p>
           <a:p>
             <a:pPr lvl="3"/>
             <a:r>
-              <a:rPr lang="en-US" smtClean="0"/>
+              <a:rPr lang="en-US"/>
               <a:t>Fourth level</a:t>
             </a:r>
           </a:p>
           <a:p>
             <a:pPr lvl="4"/>
             <a:r>
-              <a:rPr lang="en-US" smtClean="0"/>
+              <a:rPr lang="en-US"/>
               <a:t>Fifth level</a:t>
             </a:r>
-            <a:endParaRPr lang="en-US"/>
           </a:p>
         </p:txBody>
       </p:sp>
@@ -758,7 +755,7 @@
           <a:p>
             <a:fld id="{AA15078D-9DE8-47D0-8F0F-AA243E1A2060}" type="datetimeFigureOut">
               <a:rPr lang="en-US" smtClean="0"/>
-              <a:t>8/3/2017</a:t>
+              <a:t>6/10/2022</a:t>
             </a:fld>
             <a:endParaRPr lang="en-US"/>
           </a:p>
@@ -861,10 +858,9 @@
           </a:lstStyle>
           <a:p>
             <a:r>
-              <a:rPr lang="en-US" smtClean="0"/>
+              <a:rPr lang="en-US"/>
               <a:t>Click to edit Master title style</a:t>
             </a:r>
-            <a:endParaRPr lang="en-US"/>
           </a:p>
         </p:txBody>
       </p:sp>
@@ -981,7 +977,7 @@
           <a:p>
             <a:pPr lvl="0"/>
             <a:r>
-              <a:rPr lang="en-US" smtClean="0"/>
+              <a:rPr lang="en-US"/>
               <a:t>Edit Master text styles</a:t>
             </a:r>
           </a:p>
@@ -1004,7 +1000,7 @@
           <a:p>
             <a:fld id="{AA15078D-9DE8-47D0-8F0F-AA243E1A2060}" type="datetimeFigureOut">
               <a:rPr lang="en-US" smtClean="0"/>
-              <a:t>8/3/2017</a:t>
+              <a:t>6/10/2022</a:t>
             </a:fld>
             <a:endParaRPr lang="en-US"/>
           </a:p>
@@ -1098,10 +1094,9 @@
           <a:lstStyle/>
           <a:p>
             <a:r>
-              <a:rPr lang="en-US" smtClean="0"/>
+              <a:rPr lang="en-US"/>
               <a:t>Click to edit Master title style</a:t>
             </a:r>
-            <a:endParaRPr lang="en-US"/>
           </a:p>
         </p:txBody>
       </p:sp>
@@ -1127,38 +1122,37 @@
           <a:p>
             <a:pPr lvl="0"/>
             <a:r>
-              <a:rPr lang="en-US" smtClean="0"/>
+              <a:rPr lang="en-US"/>
               <a:t>Edit Master text styles</a:t>
             </a:r>
           </a:p>
           <a:p>
             <a:pPr lvl="1"/>
             <a:r>
-              <a:rPr lang="en-US" smtClean="0"/>
+              <a:rPr lang="en-US"/>
               <a:t>Second level</a:t>
             </a:r>
           </a:p>
           <a:p>
             <a:pPr lvl="2"/>
             <a:r>
-              <a:rPr lang="en-US" smtClean="0"/>
+              <a:rPr lang="en-US"/>
               <a:t>Third level</a:t>
             </a:r>
           </a:p>
           <a:p>
             <a:pPr lvl="3"/>
             <a:r>
-              <a:rPr lang="en-US" smtClean="0"/>
+              <a:rPr lang="en-US"/>
               <a:t>Fourth level</a:t>
             </a:r>
           </a:p>
           <a:p>
             <a:pPr lvl="4"/>
             <a:r>
-              <a:rPr lang="en-US" smtClean="0"/>
+              <a:rPr lang="en-US"/>
               <a:t>Fifth level</a:t>
             </a:r>
-            <a:endParaRPr lang="en-US"/>
           </a:p>
         </p:txBody>
       </p:sp>
@@ -1184,38 +1178,37 @@
           <a:p>
             <a:pPr lvl="0"/>
             <a:r>
-              <a:rPr lang="en-US" smtClean="0"/>
+              <a:rPr lang="en-US"/>
               <a:t>Edit Master text styles</a:t>
             </a:r>
           </a:p>
           <a:p>
             <a:pPr lvl="1"/>
             <a:r>
-              <a:rPr lang="en-US" smtClean="0"/>
+              <a:rPr lang="en-US"/>
               <a:t>Second level</a:t>
             </a:r>
           </a:p>
           <a:p>
             <a:pPr lvl="2"/>
             <a:r>
-              <a:rPr lang="en-US" smtClean="0"/>
+              <a:rPr lang="en-US"/>
               <a:t>Third level</a:t>
             </a:r>
           </a:p>
           <a:p>
             <a:pPr lvl="3"/>
             <a:r>
-              <a:rPr lang="en-US" smtClean="0"/>
+              <a:rPr lang="en-US"/>
               <a:t>Fourth level</a:t>
             </a:r>
           </a:p>
           <a:p>
             <a:pPr lvl="4"/>
             <a:r>
-              <a:rPr lang="en-US" smtClean="0"/>
+              <a:rPr lang="en-US"/>
               <a:t>Fifth level</a:t>
             </a:r>
-            <a:endParaRPr lang="en-US"/>
           </a:p>
         </p:txBody>
       </p:sp>
@@ -1236,7 +1229,7 @@
           <a:p>
             <a:fld id="{AA15078D-9DE8-47D0-8F0F-AA243E1A2060}" type="datetimeFigureOut">
               <a:rPr lang="en-US" smtClean="0"/>
-              <a:t>8/3/2017</a:t>
+              <a:t>6/10/2022</a:t>
             </a:fld>
             <a:endParaRPr lang="en-US"/>
           </a:p>
@@ -1335,10 +1328,9 @@
           <a:lstStyle/>
           <a:p>
             <a:r>
-              <a:rPr lang="en-US" smtClean="0"/>
+              <a:rPr lang="en-US"/>
               <a:t>Click to edit Master title style</a:t>
             </a:r>
-            <a:endParaRPr lang="en-US"/>
           </a:p>
         </p:txBody>
       </p:sp>
@@ -1401,7 +1393,7 @@
           <a:p>
             <a:pPr lvl="0"/>
             <a:r>
-              <a:rPr lang="en-US" smtClean="0"/>
+              <a:rPr lang="en-US"/>
               <a:t>Edit Master text styles</a:t>
             </a:r>
           </a:p>
@@ -1429,38 +1421,37 @@
           <a:p>
             <a:pPr lvl="0"/>
             <a:r>
-              <a:rPr lang="en-US" smtClean="0"/>
+              <a:rPr lang="en-US"/>
               <a:t>Edit Master text styles</a:t>
             </a:r>
           </a:p>
           <a:p>
             <a:pPr lvl="1"/>
             <a:r>
-              <a:rPr lang="en-US" smtClean="0"/>
+              <a:rPr lang="en-US"/>
               <a:t>Second level</a:t>
             </a:r>
           </a:p>
           <a:p>
             <a:pPr lvl="2"/>
             <a:r>
-              <a:rPr lang="en-US" smtClean="0"/>
+              <a:rPr lang="en-US"/>
               <a:t>Third level</a:t>
             </a:r>
           </a:p>
           <a:p>
             <a:pPr lvl="3"/>
             <a:r>
-              <a:rPr lang="en-US" smtClean="0"/>
+              <a:rPr lang="en-US"/>
               <a:t>Fourth level</a:t>
             </a:r>
           </a:p>
           <a:p>
             <a:pPr lvl="4"/>
             <a:r>
-              <a:rPr lang="en-US" smtClean="0"/>
+              <a:rPr lang="en-US"/>
               <a:t>Fifth level</a:t>
             </a:r>
-            <a:endParaRPr lang="en-US"/>
           </a:p>
         </p:txBody>
       </p:sp>
@@ -1523,7 +1514,7 @@
           <a:p>
             <a:pPr lvl="0"/>
             <a:r>
-              <a:rPr lang="en-US" smtClean="0"/>
+              <a:rPr lang="en-US"/>
               <a:t>Edit Master text styles</a:t>
             </a:r>
           </a:p>
@@ -1551,38 +1542,37 @@
           <a:p>
             <a:pPr lvl="0"/>
             <a:r>
-              <a:rPr lang="en-US" smtClean="0"/>
+              <a:rPr lang="en-US"/>
               <a:t>Edit Master text styles</a:t>
             </a:r>
           </a:p>
           <a:p>
             <a:pPr lvl="1"/>
             <a:r>
-              <a:rPr lang="en-US" smtClean="0"/>
+              <a:rPr lang="en-US"/>
               <a:t>Second level</a:t>
             </a:r>
           </a:p>
           <a:p>
             <a:pPr lvl="2"/>
             <a:r>
-              <a:rPr lang="en-US" smtClean="0"/>
+              <a:rPr lang="en-US"/>
               <a:t>Third level</a:t>
             </a:r>
           </a:p>
           <a:p>
             <a:pPr lvl="3"/>
             <a:r>
-              <a:rPr lang="en-US" smtClean="0"/>
+              <a:rPr lang="en-US"/>
               <a:t>Fourth level</a:t>
             </a:r>
           </a:p>
           <a:p>
             <a:pPr lvl="4"/>
             <a:r>
-              <a:rPr lang="en-US" smtClean="0"/>
+              <a:rPr lang="en-US"/>
               <a:t>Fifth level</a:t>
             </a:r>
-            <a:endParaRPr lang="en-US"/>
           </a:p>
         </p:txBody>
       </p:sp>
@@ -1603,7 +1593,7 @@
           <a:p>
             <a:fld id="{AA15078D-9DE8-47D0-8F0F-AA243E1A2060}" type="datetimeFigureOut">
               <a:rPr lang="en-US" smtClean="0"/>
-              <a:t>8/3/2017</a:t>
+              <a:t>6/10/2022</a:t>
             </a:fld>
             <a:endParaRPr lang="en-US"/>
           </a:p>
@@ -1697,10 +1687,9 @@
           <a:lstStyle/>
           <a:p>
             <a:r>
-              <a:rPr lang="en-US" smtClean="0"/>
+              <a:rPr lang="en-US"/>
               <a:t>Click to edit Master title style</a:t>
             </a:r>
-            <a:endParaRPr lang="en-US"/>
           </a:p>
         </p:txBody>
       </p:sp>
@@ -1721,7 +1710,7 @@
           <a:p>
             <a:fld id="{AA15078D-9DE8-47D0-8F0F-AA243E1A2060}" type="datetimeFigureOut">
               <a:rPr lang="en-US" smtClean="0"/>
-              <a:t>8/3/2017</a:t>
+              <a:t>6/10/2022</a:t>
             </a:fld>
             <a:endParaRPr lang="en-US"/>
           </a:p>
@@ -1816,7 +1805,7 @@
           <a:p>
             <a:fld id="{AA15078D-9DE8-47D0-8F0F-AA243E1A2060}" type="datetimeFigureOut">
               <a:rPr lang="en-US" smtClean="0"/>
-              <a:t>8/3/2017</a:t>
+              <a:t>6/10/2022</a:t>
             </a:fld>
             <a:endParaRPr lang="en-US"/>
           </a:p>
@@ -1919,10 +1908,9 @@
           </a:lstStyle>
           <a:p>
             <a:r>
-              <a:rPr lang="en-US" smtClean="0"/>
+              <a:rPr lang="en-US"/>
               <a:t>Click to edit Master title style</a:t>
             </a:r>
-            <a:endParaRPr lang="en-US"/>
           </a:p>
         </p:txBody>
       </p:sp>
@@ -1976,38 +1964,37 @@
           <a:p>
             <a:pPr lvl="0"/>
             <a:r>
-              <a:rPr lang="en-US" smtClean="0"/>
+              <a:rPr lang="en-US"/>
               <a:t>Edit Master text styles</a:t>
             </a:r>
           </a:p>
           <a:p>
             <a:pPr lvl="1"/>
             <a:r>
-              <a:rPr lang="en-US" smtClean="0"/>
+              <a:rPr lang="en-US"/>
               <a:t>Second level</a:t>
             </a:r>
           </a:p>
           <a:p>
             <a:pPr lvl="2"/>
             <a:r>
-              <a:rPr lang="en-US" smtClean="0"/>
+              <a:rPr lang="en-US"/>
               <a:t>Third level</a:t>
             </a:r>
           </a:p>
           <a:p>
             <a:pPr lvl="3"/>
             <a:r>
-              <a:rPr lang="en-US" smtClean="0"/>
+              <a:rPr lang="en-US"/>
               <a:t>Fourth level</a:t>
             </a:r>
           </a:p>
           <a:p>
             <a:pPr lvl="4"/>
             <a:r>
-              <a:rPr lang="en-US" smtClean="0"/>
+              <a:rPr lang="en-US"/>
               <a:t>Fifth level</a:t>
             </a:r>
-            <a:endParaRPr lang="en-US"/>
           </a:p>
         </p:txBody>
       </p:sp>
@@ -2070,7 +2057,7 @@
           <a:p>
             <a:pPr lvl="0"/>
             <a:r>
-              <a:rPr lang="en-US" smtClean="0"/>
+              <a:rPr lang="en-US"/>
               <a:t>Edit Master text styles</a:t>
             </a:r>
           </a:p>
@@ -2093,7 +2080,7 @@
           <a:p>
             <a:fld id="{AA15078D-9DE8-47D0-8F0F-AA243E1A2060}" type="datetimeFigureOut">
               <a:rPr lang="en-US" smtClean="0"/>
-              <a:t>8/3/2017</a:t>
+              <a:t>6/10/2022</a:t>
             </a:fld>
             <a:endParaRPr lang="en-US"/>
           </a:p>
@@ -2196,10 +2183,9 @@
           </a:lstStyle>
           <a:p>
             <a:r>
-              <a:rPr lang="en-US" smtClean="0"/>
+              <a:rPr lang="en-US"/>
               <a:t>Click to edit Master title style</a:t>
             </a:r>
-            <a:endParaRPr lang="en-US"/>
           </a:p>
         </p:txBody>
       </p:sp>
@@ -2323,7 +2309,7 @@
           <a:p>
             <a:pPr lvl="0"/>
             <a:r>
-              <a:rPr lang="en-US" smtClean="0"/>
+              <a:rPr lang="en-US"/>
               <a:t>Edit Master text styles</a:t>
             </a:r>
           </a:p>
@@ -2346,7 +2332,7 @@
           <a:p>
             <a:fld id="{AA15078D-9DE8-47D0-8F0F-AA243E1A2060}" type="datetimeFigureOut">
               <a:rPr lang="en-US" smtClean="0"/>
-              <a:t>8/3/2017</a:t>
+              <a:t>6/10/2022</a:t>
             </a:fld>
             <a:endParaRPr lang="en-US"/>
           </a:p>
@@ -2455,10 +2441,9 @@
           <a:lstStyle/>
           <a:p>
             <a:r>
-              <a:rPr lang="en-US" smtClean="0"/>
+              <a:rPr lang="en-US"/>
               <a:t>Click to edit Master title style</a:t>
             </a:r>
-            <a:endParaRPr lang="en-US"/>
           </a:p>
         </p:txBody>
       </p:sp>
@@ -2489,38 +2474,37 @@
           <a:p>
             <a:pPr lvl="0"/>
             <a:r>
-              <a:rPr lang="en-US" smtClean="0"/>
+              <a:rPr lang="en-US"/>
               <a:t>Edit Master text styles</a:t>
             </a:r>
           </a:p>
           <a:p>
             <a:pPr lvl="1"/>
             <a:r>
-              <a:rPr lang="en-US" smtClean="0"/>
+              <a:rPr lang="en-US"/>
               <a:t>Second level</a:t>
             </a:r>
           </a:p>
           <a:p>
             <a:pPr lvl="2"/>
             <a:r>
-              <a:rPr lang="en-US" smtClean="0"/>
+              <a:rPr lang="en-US"/>
               <a:t>Third level</a:t>
             </a:r>
           </a:p>
           <a:p>
             <a:pPr lvl="3"/>
             <a:r>
-              <a:rPr lang="en-US" smtClean="0"/>
+              <a:rPr lang="en-US"/>
               <a:t>Fourth level</a:t>
             </a:r>
           </a:p>
           <a:p>
             <a:pPr lvl="4"/>
             <a:r>
-              <a:rPr lang="en-US" smtClean="0"/>
+              <a:rPr lang="en-US"/>
               <a:t>Fifth level</a:t>
             </a:r>
-            <a:endParaRPr lang="en-US"/>
           </a:p>
         </p:txBody>
       </p:sp>
@@ -2559,7 +2543,7 @@
           <a:p>
             <a:fld id="{AA15078D-9DE8-47D0-8F0F-AA243E1A2060}" type="datetimeFigureOut">
               <a:rPr lang="en-US" smtClean="0"/>
-              <a:t>8/3/2017</a:t>
+              <a:t>6/10/2022</a:t>
             </a:fld>
             <a:endParaRPr lang="en-US"/>
           </a:p>
@@ -2966,13 +2950,88 @@
       </p:grpSpPr>
       <p:sp>
         <p:nvSpPr>
+          <p:cNvPr id="63" name="Rounded Rectangle 56">
+            <a:extLst>
+              <a:ext uri="{FF2B5EF4-FFF2-40B4-BE49-F238E27FC236}">
+                <a16:creationId xmlns:a16="http://schemas.microsoft.com/office/drawing/2014/main" id="{1DF91CEC-6997-47DE-884D-D7EB4D375930}"/>
+              </a:ext>
+            </a:extLst>
+          </p:cNvPr>
+          <p:cNvSpPr/>
+          <p:nvPr/>
+        </p:nvSpPr>
+        <p:spPr>
+          <a:xfrm>
+            <a:off x="4674179" y="291850"/>
+            <a:ext cx="5100693" cy="1696837"/>
+          </a:xfrm>
+          <a:prstGeom prst="roundRect">
+            <a:avLst/>
+          </a:prstGeom>
+          <a:solidFill>
+            <a:schemeClr val="accent6">
+              <a:lumMod val="40000"/>
+              <a:lumOff val="60000"/>
+            </a:schemeClr>
+          </a:solidFill>
+        </p:spPr>
+        <p:style>
+          <a:lnRef idx="2">
+            <a:schemeClr val="accent6">
+              <a:shade val="50000"/>
+            </a:schemeClr>
+          </a:lnRef>
+          <a:fillRef idx="1">
+            <a:schemeClr val="accent6"/>
+          </a:fillRef>
+          <a:effectRef idx="0">
+            <a:schemeClr val="accent6"/>
+          </a:effectRef>
+          <a:fontRef idx="minor">
+            <a:schemeClr val="lt1"/>
+          </a:fontRef>
+        </p:style>
+        <p:txBody>
+          <a:bodyPr rtlCol="0" anchor="ctr"/>
+          <a:lstStyle/>
+          <a:p>
+            <a:pPr algn="ctr"/>
+            <a:r>
+              <a:rPr lang="en-US" dirty="0"/>
+              <a:t>Bodies</a:t>
+            </a:r>
+          </a:p>
+          <a:p>
+            <a:pPr algn="ctr"/>
+            <a:endParaRPr lang="en-US" dirty="0"/>
+          </a:p>
+          <a:p>
+            <a:pPr algn="ctr"/>
+            <a:endParaRPr lang="en-US" dirty="0"/>
+          </a:p>
+          <a:p>
+            <a:pPr algn="ctr"/>
+            <a:endParaRPr lang="en-US" dirty="0"/>
+          </a:p>
+          <a:p>
+            <a:pPr algn="ctr"/>
+            <a:endParaRPr lang="en-US" dirty="0"/>
+          </a:p>
+          <a:p>
+            <a:pPr algn="ctr"/>
+            <a:endParaRPr lang="en-US" dirty="0"/>
+          </a:p>
+        </p:txBody>
+      </p:sp>
+      <p:sp>
+        <p:nvSpPr>
           <p:cNvPr id="4" name="Rounded Rectangle 3"/>
           <p:cNvSpPr/>
           <p:nvPr/>
         </p:nvSpPr>
         <p:spPr>
           <a:xfrm>
-            <a:off x="4054761" y="1470532"/>
+            <a:off x="5310542" y="3604629"/>
             <a:ext cx="1560945" cy="877454"/>
           </a:xfrm>
           <a:prstGeom prst="roundRect">
@@ -3001,10 +3060,9 @@
           <a:p>
             <a:pPr algn="ctr"/>
             <a:r>
-              <a:rPr lang="en-US" dirty="0" smtClean="0"/>
+              <a:rPr lang="en-US" dirty="0"/>
               <a:t>Static Equilibrium</a:t>
             </a:r>
-            <a:endParaRPr lang="en-US" dirty="0"/>
           </a:p>
         </p:txBody>
       </p:sp>
@@ -3016,7 +3074,7 @@
         </p:nvSpPr>
         <p:spPr>
           <a:xfrm>
-            <a:off x="4054762" y="142196"/>
+            <a:off x="5320571" y="2353043"/>
             <a:ext cx="1560945" cy="877454"/>
           </a:xfrm>
           <a:prstGeom prst="roundRect">
@@ -3045,10 +3103,9 @@
           <a:p>
             <a:pPr algn="ctr"/>
             <a:r>
-              <a:rPr lang="en-US" dirty="0" smtClean="0"/>
+              <a:rPr lang="en-US" dirty="0"/>
               <a:t>Newton’s Second Law</a:t>
             </a:r>
-            <a:endParaRPr lang="en-US" dirty="0"/>
           </a:p>
         </p:txBody>
       </p:sp>
@@ -3060,7 +3117,7 @@
         </p:nvSpPr>
         <p:spPr>
           <a:xfrm>
-            <a:off x="3898227" y="4221264"/>
+            <a:off x="5161516" y="5068036"/>
             <a:ext cx="1874012" cy="1372084"/>
           </a:xfrm>
           <a:prstGeom prst="roundRect">
@@ -3089,10 +3146,16 @@
           <a:p>
             <a:pPr algn="ctr"/>
             <a:r>
-              <a:rPr lang="en-US" dirty="0" smtClean="0"/>
-              <a:t>Equilibrium Analysis for a Concurrent Force System</a:t>
-            </a:r>
-            <a:endParaRPr lang="en-US" dirty="0"/>
+              <a:rPr lang="en-US" dirty="0"/>
+              <a:t>Equilibrium Analysis </a:t>
+            </a:r>
+          </a:p>
+          <a:p>
+            <a:pPr algn="ctr"/>
+            <a:r>
+              <a:rPr lang="en-US" dirty="0"/>
+              <a:t>for a Concurrent Force System</a:t>
+            </a:r>
           </a:p>
         </p:txBody>
       </p:sp>
@@ -3104,7 +3167,7 @@
         </p:nvSpPr>
         <p:spPr>
           <a:xfrm>
-            <a:off x="1545377" y="2711695"/>
+            <a:off x="2956794" y="2816213"/>
             <a:ext cx="1560945" cy="877454"/>
           </a:xfrm>
           <a:prstGeom prst="roundRect">
@@ -3133,22 +3196,107 @@
           <a:p>
             <a:pPr algn="ctr"/>
             <a:r>
-              <a:rPr lang="en-US" dirty="0" smtClean="0"/>
+              <a:rPr lang="en-US" dirty="0"/>
               <a:t>Free Body Diagrams</a:t>
             </a:r>
-            <a:endParaRPr lang="en-US" dirty="0"/>
-          </a:p>
-        </p:txBody>
-      </p:sp>
-      <p:sp>
-        <p:nvSpPr>
-          <p:cNvPr id="8" name="Rounded Rectangle 7"/>
+          </a:p>
+        </p:txBody>
+      </p:sp>
+      <p:sp>
+        <p:nvSpPr>
+          <p:cNvPr id="9" name="Rounded Rectangle 8"/>
           <p:cNvSpPr/>
           <p:nvPr/>
         </p:nvSpPr>
         <p:spPr>
           <a:xfrm>
-            <a:off x="6490482" y="2701882"/>
+            <a:off x="5315527" y="707898"/>
+            <a:ext cx="1560945" cy="877454"/>
+          </a:xfrm>
+          <a:prstGeom prst="roundRect">
+            <a:avLst/>
+          </a:prstGeom>
+        </p:spPr>
+        <p:style>
+          <a:lnRef idx="2">
+            <a:schemeClr val="accent6">
+              <a:shade val="50000"/>
+            </a:schemeClr>
+          </a:lnRef>
+          <a:fillRef idx="1">
+            <a:schemeClr val="accent6"/>
+          </a:fillRef>
+          <a:effectRef idx="0">
+            <a:schemeClr val="accent6"/>
+          </a:effectRef>
+          <a:fontRef idx="minor">
+            <a:schemeClr val="lt1"/>
+          </a:fontRef>
+        </p:style>
+        <p:txBody>
+          <a:bodyPr rtlCol="0" anchor="ctr"/>
+          <a:lstStyle/>
+          <a:p>
+            <a:pPr algn="ctr"/>
+            <a:r>
+              <a:rPr lang="en-US" dirty="0"/>
+              <a:t>Forces</a:t>
+            </a:r>
+          </a:p>
+        </p:txBody>
+      </p:sp>
+      <p:sp>
+        <p:nvSpPr>
+          <p:cNvPr id="10" name="Rounded Rectangle 9"/>
+          <p:cNvSpPr/>
+          <p:nvPr/>
+        </p:nvSpPr>
+        <p:spPr>
+          <a:xfrm>
+            <a:off x="7492122" y="2386391"/>
+            <a:ext cx="1721859" cy="877454"/>
+          </a:xfrm>
+          <a:prstGeom prst="roundRect">
+            <a:avLst/>
+          </a:prstGeom>
+        </p:spPr>
+        <p:style>
+          <a:lnRef idx="2">
+            <a:schemeClr val="accent1">
+              <a:shade val="50000"/>
+            </a:schemeClr>
+          </a:lnRef>
+          <a:fillRef idx="1">
+            <a:schemeClr val="accent1"/>
+          </a:fillRef>
+          <a:effectRef idx="0">
+            <a:schemeClr val="accent1"/>
+          </a:effectRef>
+          <a:fontRef idx="minor">
+            <a:schemeClr val="lt1"/>
+          </a:fontRef>
+        </p:style>
+        <p:txBody>
+          <a:bodyPr rtlCol="0" anchor="ctr"/>
+          <a:lstStyle/>
+          <a:p>
+            <a:pPr algn="ctr"/>
+            <a:r>
+              <a:rPr lang="en-US" dirty="0"/>
+              <a:t>Principle of Transmissibility</a:t>
+            </a:r>
+          </a:p>
+        </p:txBody>
+      </p:sp>
+      <p:sp>
+        <p:nvSpPr>
+          <p:cNvPr id="12" name="Rounded Rectangle 11"/>
+          <p:cNvSpPr/>
+          <p:nvPr/>
+        </p:nvSpPr>
+        <p:spPr>
+          <a:xfrm>
+            <a:off x="7572579" y="3604629"/>
             <a:ext cx="1560945" cy="877454"/>
           </a:xfrm>
           <a:prstGeom prst="roundRect">
@@ -3177,142 +3325,9 @@
           <a:p>
             <a:pPr algn="ctr"/>
             <a:r>
-              <a:rPr lang="en-US" dirty="0" smtClean="0"/>
-              <a:t>Point Forces as Vectors</a:t>
-            </a:r>
-            <a:endParaRPr lang="en-US" dirty="0"/>
-          </a:p>
-        </p:txBody>
-      </p:sp>
-      <p:sp>
-        <p:nvSpPr>
-          <p:cNvPr id="9" name="Rounded Rectangle 8"/>
-          <p:cNvSpPr/>
-          <p:nvPr/>
-        </p:nvSpPr>
-        <p:spPr>
-          <a:xfrm>
-            <a:off x="6490482" y="1470532"/>
-            <a:ext cx="1560945" cy="877454"/>
-          </a:xfrm>
-          <a:prstGeom prst="roundRect">
-            <a:avLst/>
-          </a:prstGeom>
-        </p:spPr>
-        <p:style>
-          <a:lnRef idx="2">
-            <a:schemeClr val="accent6">
-              <a:shade val="50000"/>
-            </a:schemeClr>
-          </a:lnRef>
-          <a:fillRef idx="1">
-            <a:schemeClr val="accent6"/>
-          </a:fillRef>
-          <a:effectRef idx="0">
-            <a:schemeClr val="accent6"/>
-          </a:effectRef>
-          <a:fontRef idx="minor">
-            <a:schemeClr val="lt1"/>
-          </a:fontRef>
-        </p:style>
-        <p:txBody>
-          <a:bodyPr rtlCol="0" anchor="ctr"/>
-          <a:lstStyle/>
-          <a:p>
-            <a:pPr algn="ctr"/>
-            <a:r>
-              <a:rPr lang="en-US" dirty="0" smtClean="0"/>
-              <a:t>Forces</a:t>
-            </a:r>
-            <a:endParaRPr lang="en-US" dirty="0"/>
-          </a:p>
-        </p:txBody>
-      </p:sp>
-      <p:sp>
-        <p:nvSpPr>
-          <p:cNvPr id="10" name="Rounded Rectangle 9"/>
-          <p:cNvSpPr/>
-          <p:nvPr/>
-        </p:nvSpPr>
-        <p:spPr>
-          <a:xfrm>
-            <a:off x="8831900" y="2701882"/>
-            <a:ext cx="1721859" cy="877454"/>
-          </a:xfrm>
-          <a:prstGeom prst="roundRect">
-            <a:avLst/>
-          </a:prstGeom>
-        </p:spPr>
-        <p:style>
-          <a:lnRef idx="2">
-            <a:schemeClr val="accent1">
-              <a:shade val="50000"/>
-            </a:schemeClr>
-          </a:lnRef>
-          <a:fillRef idx="1">
-            <a:schemeClr val="accent1"/>
-          </a:fillRef>
-          <a:effectRef idx="0">
-            <a:schemeClr val="accent1"/>
-          </a:effectRef>
-          <a:fontRef idx="minor">
-            <a:schemeClr val="lt1"/>
-          </a:fontRef>
-        </p:style>
-        <p:txBody>
-          <a:bodyPr rtlCol="0" anchor="ctr"/>
-          <a:lstStyle/>
-          <a:p>
-            <a:pPr algn="ctr"/>
-            <a:r>
-              <a:rPr lang="en-US" dirty="0" smtClean="0"/>
-              <a:t>Principle of Transmissibility</a:t>
-            </a:r>
-            <a:endParaRPr lang="en-US" dirty="0"/>
-          </a:p>
-        </p:txBody>
-      </p:sp>
-      <p:sp>
-        <p:nvSpPr>
-          <p:cNvPr id="12" name="Rounded Rectangle 11"/>
-          <p:cNvSpPr/>
-          <p:nvPr/>
-        </p:nvSpPr>
-        <p:spPr>
-          <a:xfrm>
-            <a:off x="8912356" y="4468579"/>
-            <a:ext cx="1560945" cy="877454"/>
-          </a:xfrm>
-          <a:prstGeom prst="roundRect">
-            <a:avLst/>
-          </a:prstGeom>
-        </p:spPr>
-        <p:style>
-          <a:lnRef idx="2">
-            <a:schemeClr val="accent1">
-              <a:shade val="50000"/>
-            </a:schemeClr>
-          </a:lnRef>
-          <a:fillRef idx="1">
-            <a:schemeClr val="accent1"/>
-          </a:fillRef>
-          <a:effectRef idx="0">
-            <a:schemeClr val="accent1"/>
-          </a:effectRef>
-          <a:fontRef idx="minor">
-            <a:schemeClr val="lt1"/>
-          </a:fontRef>
-        </p:style>
-        <p:txBody>
-          <a:bodyPr rtlCol="0" anchor="ctr"/>
-          <a:lstStyle/>
-          <a:p>
-            <a:pPr algn="ctr"/>
-            <a:r>
-              <a:rPr lang="en-US" dirty="0" smtClean="0"/>
+              <a:rPr lang="en-US" dirty="0"/>
               <a:t>Concurrent Forces</a:t>
             </a:r>
-            <a:endParaRPr lang="en-US" dirty="0"/>
           </a:p>
         </p:txBody>
       </p:sp>
@@ -3327,8 +3342,8 @@
         </p:nvCxnSpPr>
         <p:spPr>
           <a:xfrm flipH="1">
-            <a:off x="4835234" y="1019650"/>
-            <a:ext cx="1" cy="450882"/>
+            <a:off x="6091015" y="3230497"/>
+            <a:ext cx="10029" cy="374132"/>
           </a:xfrm>
           <a:prstGeom prst="straightConnector1">
             <a:avLst/>
@@ -3356,15 +3371,16 @@
         <p:nvCxnSpPr>
           <p:cNvPr id="17" name="Straight Arrow Connector 16"/>
           <p:cNvCxnSpPr>
-            <a:stCxn id="4" idx="3"/>
-            <a:endCxn id="9" idx="1"/>
+            <a:cxnSpLocks/>
+            <a:stCxn id="9" idx="3"/>
+            <a:endCxn id="59" idx="1"/>
           </p:cNvCxnSpPr>
           <p:nvPr/>
         </p:nvCxnSpPr>
         <p:spPr>
-          <a:xfrm>
-            <a:off x="5615706" y="1909259"/>
-            <a:ext cx="874776" cy="0"/>
+          <a:xfrm flipV="1">
+            <a:off x="6876472" y="1146175"/>
+            <a:ext cx="696108" cy="450"/>
           </a:xfrm>
           <a:prstGeom prst="straightConnector1">
             <a:avLst/>
@@ -3392,15 +3408,16 @@
         <p:nvCxnSpPr>
           <p:cNvPr id="20" name="Straight Arrow Connector 19"/>
           <p:cNvCxnSpPr>
+            <a:cxnSpLocks/>
             <a:stCxn id="9" idx="2"/>
-            <a:endCxn id="8" idx="0"/>
+            <a:endCxn id="5" idx="0"/>
           </p:cNvCxnSpPr>
           <p:nvPr/>
         </p:nvCxnSpPr>
         <p:spPr>
           <a:xfrm>
-            <a:off x="7270955" y="2347986"/>
-            <a:ext cx="0" cy="353896"/>
+            <a:off x="6096000" y="1585352"/>
+            <a:ext cx="5044" cy="767691"/>
           </a:xfrm>
           <a:prstGeom prst="straightConnector1">
             <a:avLst/>
@@ -3434,45 +3451,9 @@
           <p:nvPr/>
         </p:nvCxnSpPr>
         <p:spPr>
-          <a:xfrm flipH="1">
-            <a:off x="4835233" y="2347986"/>
-            <a:ext cx="1" cy="1873278"/>
-          </a:xfrm>
-          <a:prstGeom prst="straightConnector1">
-            <a:avLst/>
-          </a:prstGeom>
-          <a:ln w="38100">
-            <a:tailEnd type="triangle"/>
-          </a:ln>
-        </p:spPr>
-        <p:style>
-          <a:lnRef idx="3">
-            <a:schemeClr val="dk1"/>
-          </a:lnRef>
-          <a:fillRef idx="0">
-            <a:schemeClr val="dk1"/>
-          </a:fillRef>
-          <a:effectRef idx="2">
-            <a:schemeClr val="dk1"/>
-          </a:effectRef>
-          <a:fontRef idx="minor">
-            <a:schemeClr val="tx1"/>
-          </a:fontRef>
-        </p:style>
-      </p:cxnSp>
-      <p:cxnSp>
-        <p:nvCxnSpPr>
-          <p:cNvPr id="26" name="Straight Arrow Connector 25"/>
-          <p:cNvCxnSpPr>
-            <a:stCxn id="7" idx="2"/>
-            <a:endCxn id="6" idx="0"/>
-          </p:cNvCxnSpPr>
-          <p:nvPr/>
-        </p:nvCxnSpPr>
-        <p:spPr>
           <a:xfrm>
-            <a:off x="2325850" y="3589149"/>
-            <a:ext cx="2509383" cy="632115"/>
+            <a:off x="6091015" y="4482083"/>
+            <a:ext cx="7507" cy="585953"/>
           </a:xfrm>
           <a:prstGeom prst="straightConnector1">
             <a:avLst/>
@@ -3500,15 +3481,15 @@
         <p:nvCxnSpPr>
           <p:cNvPr id="30" name="Straight Arrow Connector 29"/>
           <p:cNvCxnSpPr>
-            <a:stCxn id="8" idx="2"/>
-            <a:endCxn id="6" idx="0"/>
+            <a:cxnSpLocks/>
+            <a:stCxn id="10" idx="2"/>
           </p:cNvCxnSpPr>
           <p:nvPr/>
         </p:nvCxnSpPr>
         <p:spPr>
-          <a:xfrm flipH="1">
-            <a:off x="4835233" y="3579336"/>
-            <a:ext cx="2435722" cy="641928"/>
+          <a:xfrm>
+            <a:off x="8353052" y="3263845"/>
+            <a:ext cx="0" cy="340784"/>
           </a:xfrm>
           <a:prstGeom prst="straightConnector1">
             <a:avLst/>
@@ -3534,17 +3515,24 @@
       </p:cxnSp>
       <p:cxnSp>
         <p:nvCxnSpPr>
-          <p:cNvPr id="33" name="Straight Arrow Connector 32"/>
+          <p:cNvPr id="53" name="Straight Arrow Connector 52">
+            <a:extLst>
+              <a:ext uri="{FF2B5EF4-FFF2-40B4-BE49-F238E27FC236}">
+                <a16:creationId xmlns:a16="http://schemas.microsoft.com/office/drawing/2014/main" id="{647254F3-AE06-4F93-B6FF-A8E174084E52}"/>
+              </a:ext>
+            </a:extLst>
+          </p:cNvPr>
           <p:cNvCxnSpPr>
-            <a:stCxn id="8" idx="3"/>
-            <a:endCxn id="10" idx="1"/>
+            <a:cxnSpLocks/>
+            <a:stCxn id="9" idx="2"/>
+            <a:endCxn id="10" idx="0"/>
           </p:cNvCxnSpPr>
           <p:nvPr/>
         </p:nvCxnSpPr>
         <p:spPr>
           <a:xfrm>
-            <a:off x="8051427" y="3140609"/>
-            <a:ext cx="780473" cy="0"/>
+            <a:off x="6096000" y="1585352"/>
+            <a:ext cx="2257052" cy="801039"/>
           </a:xfrm>
           <a:prstGeom prst="straightConnector1">
             <a:avLst/>
@@ -3568,87 +3556,22 @@
           </a:fontRef>
         </p:style>
       </p:cxnSp>
-      <p:cxnSp>
-        <p:nvCxnSpPr>
-          <p:cNvPr id="38" name="Straight Arrow Connector 37"/>
-          <p:cNvCxnSpPr>
-            <a:stCxn id="12" idx="1"/>
-          </p:cNvCxnSpPr>
-          <p:nvPr/>
-        </p:nvCxnSpPr>
-        <p:spPr>
-          <a:xfrm flipH="1" flipV="1">
-            <a:off x="8692934" y="4895518"/>
-            <a:ext cx="219422" cy="0"/>
-          </a:xfrm>
-          <a:prstGeom prst="straightConnector1">
-            <a:avLst/>
-          </a:prstGeom>
-          <a:ln w="38100">
-            <a:tailEnd type="triangle"/>
-          </a:ln>
-        </p:spPr>
-        <p:style>
-          <a:lnRef idx="3">
-            <a:schemeClr val="dk1"/>
-          </a:lnRef>
-          <a:fillRef idx="0">
-            <a:schemeClr val="dk1"/>
-          </a:fillRef>
-          <a:effectRef idx="2">
-            <a:schemeClr val="dk1"/>
-          </a:effectRef>
-          <a:fontRef idx="minor">
-            <a:schemeClr val="tx1"/>
-          </a:fontRef>
-        </p:style>
-      </p:cxnSp>
-      <p:cxnSp>
-        <p:nvCxnSpPr>
-          <p:cNvPr id="46" name="Straight Arrow Connector 45"/>
-          <p:cNvCxnSpPr>
-            <a:stCxn id="10" idx="2"/>
-            <a:endCxn id="12" idx="0"/>
-          </p:cNvCxnSpPr>
-          <p:nvPr/>
-        </p:nvCxnSpPr>
-        <p:spPr>
-          <a:xfrm flipH="1">
-            <a:off x="9692829" y="3579336"/>
-            <a:ext cx="1" cy="889243"/>
-          </a:xfrm>
-          <a:prstGeom prst="straightConnector1">
-            <a:avLst/>
-          </a:prstGeom>
-          <a:ln w="38100">
-            <a:tailEnd type="triangle"/>
-          </a:ln>
-        </p:spPr>
-        <p:style>
-          <a:lnRef idx="3">
-            <a:schemeClr val="dk1"/>
-          </a:lnRef>
-          <a:fillRef idx="0">
-            <a:schemeClr val="dk1"/>
-          </a:fillRef>
-          <a:effectRef idx="2">
-            <a:schemeClr val="dk1"/>
-          </a:effectRef>
-          <a:fontRef idx="minor">
-            <a:schemeClr val="tx1"/>
-          </a:fontRef>
-        </p:style>
-      </p:cxnSp>
-      <p:sp>
-        <p:nvSpPr>
-          <p:cNvPr id="62" name="Rounded Rectangle 61"/>
+      <p:sp>
+        <p:nvSpPr>
+          <p:cNvPr id="59" name="Rounded Rectangle 8">
+            <a:extLst>
+              <a:ext uri="{FF2B5EF4-FFF2-40B4-BE49-F238E27FC236}">
+                <a16:creationId xmlns:a16="http://schemas.microsoft.com/office/drawing/2014/main" id="{B6E5CFBB-86E6-43DD-8613-A85EAAF998A1}"/>
+              </a:ext>
+            </a:extLst>
+          </p:cNvPr>
           <p:cNvSpPr/>
           <p:nvPr/>
         </p:nvSpPr>
         <p:spPr>
           <a:xfrm>
-            <a:off x="7468388" y="4456790"/>
-            <a:ext cx="1246535" cy="877454"/>
+            <a:off x="7572580" y="707448"/>
+            <a:ext cx="1560945" cy="877454"/>
           </a:xfrm>
           <a:prstGeom prst="roundRect">
             <a:avLst/>
@@ -3676,61 +3599,9 @@
           <a:p>
             <a:pPr algn="ctr"/>
             <a:r>
-              <a:rPr lang="en-US" dirty="0" smtClean="0"/>
-              <a:t>Bodies</a:t>
-            </a:r>
-          </a:p>
-          <a:p>
-            <a:pPr algn="ctr"/>
-            <a:r>
-              <a:rPr lang="en-US" dirty="0" smtClean="0"/>
-              <a:t>(Particles)</a:t>
-            </a:r>
-            <a:endParaRPr lang="en-US" dirty="0"/>
-          </a:p>
-        </p:txBody>
-      </p:sp>
-      <p:sp>
-        <p:nvSpPr>
-          <p:cNvPr id="76" name="Rounded Rectangle 75"/>
-          <p:cNvSpPr/>
-          <p:nvPr/>
-        </p:nvSpPr>
-        <p:spPr>
-          <a:xfrm>
-            <a:off x="6047870" y="4477270"/>
-            <a:ext cx="1242051" cy="877454"/>
-          </a:xfrm>
-          <a:prstGeom prst="roundRect">
-            <a:avLst/>
-          </a:prstGeom>
-        </p:spPr>
-        <p:style>
-          <a:lnRef idx="2">
-            <a:schemeClr val="accent6">
-              <a:shade val="50000"/>
-            </a:schemeClr>
-          </a:lnRef>
-          <a:fillRef idx="1">
-            <a:schemeClr val="accent6"/>
-          </a:fillRef>
-          <a:effectRef idx="0">
-            <a:schemeClr val="accent6"/>
-          </a:effectRef>
-          <a:fontRef idx="minor">
-            <a:schemeClr val="lt1"/>
-          </a:fontRef>
-        </p:style>
-        <p:txBody>
-          <a:bodyPr rtlCol="0" anchor="ctr"/>
-          <a:lstStyle/>
-          <a:p>
-            <a:pPr algn="ctr"/>
-            <a:r>
-              <a:rPr lang="en-US" dirty="0" smtClean="0"/>
+              <a:rPr lang="en-US" dirty="0"/>
               <a:t>Moments</a:t>
             </a:r>
-            <a:endParaRPr lang="en-US" dirty="0"/>
           </a:p>
         </p:txBody>
       </p:sp>
@@ -3742,7 +3613,7 @@
         </p:nvSpPr>
         <p:spPr>
           <a:xfrm>
-            <a:off x="5684191" y="4407442"/>
+            <a:off x="7397158" y="619866"/>
             <a:ext cx="2007451" cy="1037814"/>
           </a:xfrm>
           <a:prstGeom prst="mathMultiply">
@@ -3786,19 +3657,71 @@
       </p:sp>
       <p:cxnSp>
         <p:nvCxnSpPr>
-          <p:cNvPr id="78" name="Straight Arrow Connector 77"/>
+          <p:cNvPr id="94" name="Connector: Elbow 93">
+            <a:extLst>
+              <a:ext uri="{FF2B5EF4-FFF2-40B4-BE49-F238E27FC236}">
+                <a16:creationId xmlns:a16="http://schemas.microsoft.com/office/drawing/2014/main" id="{56151A6D-D2C4-4B9C-A9DC-BBB4742E8855}"/>
+              </a:ext>
+            </a:extLst>
+          </p:cNvPr>
           <p:cNvCxnSpPr>
-            <a:stCxn id="76" idx="1"/>
-            <a:endCxn id="6" idx="3"/>
+            <a:cxnSpLocks/>
+            <a:stCxn id="12" idx="3"/>
+            <a:endCxn id="59" idx="3"/>
           </p:cNvCxnSpPr>
           <p:nvPr/>
         </p:nvCxnSpPr>
         <p:spPr>
-          <a:xfrm flipH="1" flipV="1">
-            <a:off x="5772239" y="4907306"/>
-            <a:ext cx="275631" cy="0"/>
+          <a:xfrm flipV="1">
+            <a:off x="9133524" y="1146175"/>
+            <a:ext cx="1" cy="2897181"/>
           </a:xfrm>
-          <a:prstGeom prst="straightConnector1">
+          <a:prstGeom prst="bentConnector3">
+            <a:avLst>
+              <a:gd name="adj1" fmla="val 22860100000"/>
+            </a:avLst>
+          </a:prstGeom>
+          <a:ln w="38100">
+            <a:tailEnd type="triangle"/>
+          </a:ln>
+        </p:spPr>
+        <p:style>
+          <a:lnRef idx="3">
+            <a:schemeClr val="dk1"/>
+          </a:lnRef>
+          <a:fillRef idx="0">
+            <a:schemeClr val="dk1"/>
+          </a:fillRef>
+          <a:effectRef idx="2">
+            <a:schemeClr val="dk1"/>
+          </a:effectRef>
+          <a:fontRef idx="minor">
+            <a:schemeClr val="tx1"/>
+          </a:fontRef>
+        </p:style>
+      </p:cxnSp>
+      <p:cxnSp>
+        <p:nvCxnSpPr>
+          <p:cNvPr id="108" name="Connector: Elbow 107">
+            <a:extLst>
+              <a:ext uri="{FF2B5EF4-FFF2-40B4-BE49-F238E27FC236}">
+                <a16:creationId xmlns:a16="http://schemas.microsoft.com/office/drawing/2014/main" id="{E866613B-6BB1-4737-9A92-4BC006E5E1EE}"/>
+              </a:ext>
+            </a:extLst>
+          </p:cNvPr>
+          <p:cNvCxnSpPr>
+            <a:cxnSpLocks/>
+            <a:stCxn id="9" idx="1"/>
+            <a:endCxn id="7" idx="0"/>
+          </p:cNvCxnSpPr>
+          <p:nvPr/>
+        </p:nvCxnSpPr>
+        <p:spPr>
+          <a:xfrm rot="10800000" flipV="1">
+            <a:off x="3737267" y="1146625"/>
+            <a:ext cx="1578260" cy="1669588"/>
+          </a:xfrm>
+          <a:prstGeom prst="bentConnector2">
             <a:avLst/>
           </a:prstGeom>
           <a:ln w="38100">
@@ -3822,19 +3745,26 @@
       </p:cxnSp>
       <p:cxnSp>
         <p:nvCxnSpPr>
-          <p:cNvPr id="82" name="Straight Arrow Connector 81"/>
+          <p:cNvPr id="111" name="Connector: Elbow 110">
+            <a:extLst>
+              <a:ext uri="{FF2B5EF4-FFF2-40B4-BE49-F238E27FC236}">
+                <a16:creationId xmlns:a16="http://schemas.microsoft.com/office/drawing/2014/main" id="{BFAECDF9-826E-4782-BCEE-4EC69FC5BF7B}"/>
+              </a:ext>
+            </a:extLst>
+          </p:cNvPr>
           <p:cNvCxnSpPr>
-            <a:stCxn id="62" idx="1"/>
-            <a:endCxn id="76" idx="3"/>
+            <a:cxnSpLocks/>
+            <a:stCxn id="7" idx="2"/>
+            <a:endCxn id="6" idx="1"/>
           </p:cNvCxnSpPr>
           <p:nvPr/>
         </p:nvCxnSpPr>
         <p:spPr>
-          <a:xfrm flipH="1">
-            <a:off x="7289921" y="4895517"/>
-            <a:ext cx="178467" cy="0"/>
+          <a:xfrm rot="16200000" flipH="1">
+            <a:off x="3419186" y="4011747"/>
+            <a:ext cx="2060411" cy="1424249"/>
           </a:xfrm>
-          <a:prstGeom prst="straightConnector1">
+          <a:prstGeom prst="bentConnector2">
             <a:avLst/>
           </a:prstGeom>
           <a:ln w="38100">
@@ -3900,7 +3830,7 @@
                                           </p:stCondLst>
                                         </p:cTn>
                                         <p:tgtEl>
-                                          <p:spTgt spid="4"/>
+                                          <p:spTgt spid="63"/>
                                         </p:tgtEl>
                                         <p:attrNameLst>
                                           <p:attrName>style.visibility</p:attrName>
@@ -3914,7 +3844,7 @@
                                       <p:cBhvr>
                                         <p:cTn id="7" dur="500"/>
                                         <p:tgtEl>
-                                          <p:spTgt spid="4"/>
+                                          <p:spTgt spid="63"/>
                                         </p:tgtEl>
                                       </p:cBhvr>
                                     </p:animEffect>
@@ -3940,7 +3870,7 @@
                             </p:stCondLst>
                             <p:childTnLst>
                               <p:par>
-                                <p:cTn id="10" presetID="10" presetClass="entr" presetSubtype="0" fill="hold" nodeType="clickEffect">
+                                <p:cTn id="10" presetID="10" presetClass="entr" presetSubtype="0" fill="hold" grpId="0" nodeType="clickEffect">
                                   <p:stCondLst>
                                     <p:cond delay="0"/>
                                   </p:stCondLst>
@@ -3948,6 +3878,147 @@
                                     <p:set>
                                       <p:cBhvr>
                                         <p:cTn id="11" dur="1" fill="hold">
+                                          <p:stCondLst>
+                                            <p:cond delay="0"/>
+                                          </p:stCondLst>
+                                        </p:cTn>
+                                        <p:tgtEl>
+                                          <p:spTgt spid="9"/>
+                                        </p:tgtEl>
+                                        <p:attrNameLst>
+                                          <p:attrName>style.visibility</p:attrName>
+                                        </p:attrNameLst>
+                                      </p:cBhvr>
+                                      <p:to>
+                                        <p:strVal val="visible"/>
+                                      </p:to>
+                                    </p:set>
+                                    <p:animEffect transition="in" filter="fade">
+                                      <p:cBhvr>
+                                        <p:cTn id="12" dur="500"/>
+                                        <p:tgtEl>
+                                          <p:spTgt spid="9"/>
+                                        </p:tgtEl>
+                                      </p:cBhvr>
+                                    </p:animEffect>
+                                  </p:childTnLst>
+                                </p:cTn>
+                              </p:par>
+                            </p:childTnLst>
+                          </p:cTn>
+                        </p:par>
+                      </p:childTnLst>
+                    </p:cTn>
+                  </p:par>
+                  <p:par>
+                    <p:cTn id="13" fill="hold">
+                      <p:stCondLst>
+                        <p:cond delay="indefinite"/>
+                      </p:stCondLst>
+                      <p:childTnLst>
+                        <p:par>
+                          <p:cTn id="14" fill="hold">
+                            <p:stCondLst>
+                              <p:cond delay="0"/>
+                            </p:stCondLst>
+                            <p:childTnLst>
+                              <p:par>
+                                <p:cTn id="15" presetID="10" presetClass="entr" presetSubtype="0" fill="hold" nodeType="clickEffect">
+                                  <p:stCondLst>
+                                    <p:cond delay="0"/>
+                                  </p:stCondLst>
+                                  <p:childTnLst>
+                                    <p:set>
+                                      <p:cBhvr>
+                                        <p:cTn id="16" dur="1" fill="hold">
+                                          <p:stCondLst>
+                                            <p:cond delay="0"/>
+                                          </p:stCondLst>
+                                        </p:cTn>
+                                        <p:tgtEl>
+                                          <p:spTgt spid="20"/>
+                                        </p:tgtEl>
+                                        <p:attrNameLst>
+                                          <p:attrName>style.visibility</p:attrName>
+                                        </p:attrNameLst>
+                                      </p:cBhvr>
+                                      <p:to>
+                                        <p:strVal val="visible"/>
+                                      </p:to>
+                                    </p:set>
+                                    <p:animEffect transition="in" filter="fade">
+                                      <p:cBhvr>
+                                        <p:cTn id="17" dur="500"/>
+                                        <p:tgtEl>
+                                          <p:spTgt spid="20"/>
+                                        </p:tgtEl>
+                                      </p:cBhvr>
+                                    </p:animEffect>
+                                  </p:childTnLst>
+                                </p:cTn>
+                              </p:par>
+                              <p:par>
+                                <p:cTn id="18" presetID="10" presetClass="entr" presetSubtype="0" fill="hold" grpId="0" nodeType="withEffect">
+                                  <p:stCondLst>
+                                    <p:cond delay="0"/>
+                                  </p:stCondLst>
+                                  <p:childTnLst>
+                                    <p:set>
+                                      <p:cBhvr>
+                                        <p:cTn id="19" dur="1" fill="hold">
+                                          <p:stCondLst>
+                                            <p:cond delay="0"/>
+                                          </p:stCondLst>
+                                        </p:cTn>
+                                        <p:tgtEl>
+                                          <p:spTgt spid="5"/>
+                                        </p:tgtEl>
+                                        <p:attrNameLst>
+                                          <p:attrName>style.visibility</p:attrName>
+                                        </p:attrNameLst>
+                                      </p:cBhvr>
+                                      <p:to>
+                                        <p:strVal val="visible"/>
+                                      </p:to>
+                                    </p:set>
+                                    <p:animEffect transition="in" filter="fade">
+                                      <p:cBhvr>
+                                        <p:cTn id="20" dur="500"/>
+                                        <p:tgtEl>
+                                          <p:spTgt spid="5"/>
+                                        </p:tgtEl>
+                                      </p:cBhvr>
+                                    </p:animEffect>
+                                  </p:childTnLst>
+                                </p:cTn>
+                              </p:par>
+                            </p:childTnLst>
+                          </p:cTn>
+                        </p:par>
+                      </p:childTnLst>
+                    </p:cTn>
+                  </p:par>
+                  <p:par>
+                    <p:cTn id="21" fill="hold">
+                      <p:stCondLst>
+                        <p:cond delay="indefinite"/>
+                      </p:stCondLst>
+                      <p:childTnLst>
+                        <p:par>
+                          <p:cTn id="22" fill="hold">
+                            <p:stCondLst>
+                              <p:cond delay="0"/>
+                            </p:stCondLst>
+                            <p:childTnLst>
+                              <p:par>
+                                <p:cTn id="23" presetID="10" presetClass="entr" presetSubtype="0" fill="hold" nodeType="clickEffect">
+                                  <p:stCondLst>
+                                    <p:cond delay="0"/>
+                                  </p:stCondLst>
+                                  <p:childTnLst>
+                                    <p:set>
+                                      <p:cBhvr>
+                                        <p:cTn id="24" dur="1" fill="hold">
                                           <p:stCondLst>
                                             <p:cond delay="0"/>
                                           </p:stCondLst>
@@ -3965,7 +4036,7 @@
                                     </p:set>
                                     <p:animEffect transition="in" filter="fade">
                                       <p:cBhvr>
-                                        <p:cTn id="12" dur="500"/>
+                                        <p:cTn id="25" dur="500"/>
                                         <p:tgtEl>
                                           <p:spTgt spid="14"/>
                                         </p:tgtEl>
@@ -3975,20 +4046,20 @@
                                 </p:cTn>
                               </p:par>
                               <p:par>
-                                <p:cTn id="13" presetID="10" presetClass="entr" presetSubtype="0" fill="hold" grpId="0" nodeType="withEffect">
+                                <p:cTn id="26" presetID="10" presetClass="entr" presetSubtype="0" fill="hold" grpId="0" nodeType="withEffect">
                                   <p:stCondLst>
                                     <p:cond delay="0"/>
                                   </p:stCondLst>
                                   <p:childTnLst>
                                     <p:set>
                                       <p:cBhvr>
-                                        <p:cTn id="14" dur="1" fill="hold">
+                                        <p:cTn id="27" dur="1" fill="hold">
                                           <p:stCondLst>
                                             <p:cond delay="0"/>
                                           </p:stCondLst>
                                         </p:cTn>
                                         <p:tgtEl>
-                                          <p:spTgt spid="5"/>
+                                          <p:spTgt spid="4"/>
                                         </p:tgtEl>
                                         <p:attrNameLst>
                                           <p:attrName>style.visibility</p:attrName>
@@ -4000,9 +4071,9 @@
                                     </p:set>
                                     <p:animEffect transition="in" filter="fade">
                                       <p:cBhvr>
-                                        <p:cTn id="15" dur="500"/>
+                                        <p:cTn id="28" dur="500"/>
                                         <p:tgtEl>
-                                          <p:spTgt spid="5"/>
+                                          <p:spTgt spid="4"/>
                                         </p:tgtEl>
                                       </p:cBhvr>
                                     </p:animEffect>
@@ -4016,26 +4087,149 @@
                     </p:cTn>
                   </p:par>
                   <p:par>
-                    <p:cTn id="16" fill="hold">
+                    <p:cTn id="29" fill="hold">
                       <p:stCondLst>
                         <p:cond delay="indefinite"/>
                       </p:stCondLst>
                       <p:childTnLst>
                         <p:par>
-                          <p:cTn id="17" fill="hold">
+                          <p:cTn id="30" fill="hold">
                             <p:stCondLst>
                               <p:cond delay="0"/>
                             </p:stCondLst>
                             <p:childTnLst>
                               <p:par>
-                                <p:cTn id="18" presetID="10" presetClass="entr" presetSubtype="0" fill="hold" nodeType="clickEffect">
+                                <p:cTn id="31" presetID="10" presetClass="entr" presetSubtype="0" fill="hold" nodeType="clickEffect">
                                   <p:stCondLst>
                                     <p:cond delay="0"/>
                                   </p:stCondLst>
                                   <p:childTnLst>
                                     <p:set>
                                       <p:cBhvr>
-                                        <p:cTn id="19" dur="1" fill="hold">
+                                        <p:cTn id="32" dur="1" fill="hold">
+                                          <p:stCondLst>
+                                            <p:cond delay="0"/>
+                                          </p:stCondLst>
+                                        </p:cTn>
+                                        <p:tgtEl>
+                                          <p:spTgt spid="108"/>
+                                        </p:tgtEl>
+                                        <p:attrNameLst>
+                                          <p:attrName>style.visibility</p:attrName>
+                                        </p:attrNameLst>
+                                      </p:cBhvr>
+                                      <p:to>
+                                        <p:strVal val="visible"/>
+                                      </p:to>
+                                    </p:set>
+                                    <p:animEffect transition="in" filter="fade">
+                                      <p:cBhvr>
+                                        <p:cTn id="33" dur="500"/>
+                                        <p:tgtEl>
+                                          <p:spTgt spid="108"/>
+                                        </p:tgtEl>
+                                      </p:cBhvr>
+                                    </p:animEffect>
+                                  </p:childTnLst>
+                                </p:cTn>
+                              </p:par>
+                              <p:par>
+                                <p:cTn id="34" presetID="10" presetClass="entr" presetSubtype="0" fill="hold" grpId="0" nodeType="withEffect">
+                                  <p:stCondLst>
+                                    <p:cond delay="0"/>
+                                  </p:stCondLst>
+                                  <p:childTnLst>
+                                    <p:set>
+                                      <p:cBhvr>
+                                        <p:cTn id="35" dur="1" fill="hold">
+                                          <p:stCondLst>
+                                            <p:cond delay="0"/>
+                                          </p:stCondLst>
+                                        </p:cTn>
+                                        <p:tgtEl>
+                                          <p:spTgt spid="7"/>
+                                        </p:tgtEl>
+                                        <p:attrNameLst>
+                                          <p:attrName>style.visibility</p:attrName>
+                                        </p:attrNameLst>
+                                      </p:cBhvr>
+                                      <p:to>
+                                        <p:strVal val="visible"/>
+                                      </p:to>
+                                    </p:set>
+                                    <p:animEffect transition="in" filter="fade">
+                                      <p:cBhvr>
+                                        <p:cTn id="36" dur="500"/>
+                                        <p:tgtEl>
+                                          <p:spTgt spid="7"/>
+                                        </p:tgtEl>
+                                      </p:cBhvr>
+                                    </p:animEffect>
+                                  </p:childTnLst>
+                                </p:cTn>
+                              </p:par>
+                            </p:childTnLst>
+                          </p:cTn>
+                        </p:par>
+                      </p:childTnLst>
+                    </p:cTn>
+                  </p:par>
+                  <p:par>
+                    <p:cTn id="37" fill="hold">
+                      <p:stCondLst>
+                        <p:cond delay="indefinite"/>
+                      </p:stCondLst>
+                      <p:childTnLst>
+                        <p:par>
+                          <p:cTn id="38" fill="hold">
+                            <p:stCondLst>
+                              <p:cond delay="0"/>
+                            </p:stCondLst>
+                            <p:childTnLst>
+                              <p:par>
+                                <p:cTn id="39" presetID="10" presetClass="entr" presetSubtype="0" fill="hold" nodeType="clickEffect">
+                                  <p:stCondLst>
+                                    <p:cond delay="0"/>
+                                  </p:stCondLst>
+                                  <p:childTnLst>
+                                    <p:set>
+                                      <p:cBhvr>
+                                        <p:cTn id="40" dur="1" fill="hold">
+                                          <p:stCondLst>
+                                            <p:cond delay="0"/>
+                                          </p:stCondLst>
+                                        </p:cTn>
+                                        <p:tgtEl>
+                                          <p:spTgt spid="111"/>
+                                        </p:tgtEl>
+                                        <p:attrNameLst>
+                                          <p:attrName>style.visibility</p:attrName>
+                                        </p:attrNameLst>
+                                      </p:cBhvr>
+                                      <p:to>
+                                        <p:strVal val="visible"/>
+                                      </p:to>
+                                    </p:set>
+                                    <p:animEffect transition="in" filter="fade">
+                                      <p:cBhvr>
+                                        <p:cTn id="41" dur="500"/>
+                                        <p:tgtEl>
+                                          <p:spTgt spid="111"/>
+                                        </p:tgtEl>
+                                      </p:cBhvr>
+                                    </p:animEffect>
+                                  </p:childTnLst>
+                                </p:cTn>
+                              </p:par>
+                              <p:par>
+                                <p:cTn id="42" presetID="10" presetClass="entr" presetSubtype="0" fill="hold" nodeType="withEffect">
+                                  <p:stCondLst>
+                                    <p:cond delay="0"/>
+                                  </p:stCondLst>
+                                  <p:childTnLst>
+                                    <p:set>
+                                      <p:cBhvr>
+                                        <p:cTn id="43" dur="1" fill="hold">
                                           <p:stCondLst>
                                             <p:cond delay="0"/>
                                           </p:stCondLst>
@@ -4053,273 +4247,9 @@
                                     </p:set>
                                     <p:animEffect transition="in" filter="fade">
                                       <p:cBhvr>
-                                        <p:cTn id="20" dur="500"/>
+                                        <p:cTn id="44" dur="500"/>
                                         <p:tgtEl>
                                           <p:spTgt spid="23"/>
-                                        </p:tgtEl>
-                                      </p:cBhvr>
-                                    </p:animEffect>
-                                  </p:childTnLst>
-                                </p:cTn>
-                              </p:par>
-                              <p:par>
-                                <p:cTn id="21" presetID="10" presetClass="entr" presetSubtype="0" fill="hold" grpId="0" nodeType="withEffect">
-                                  <p:stCondLst>
-                                    <p:cond delay="0"/>
-                                  </p:stCondLst>
-                                  <p:childTnLst>
-                                    <p:set>
-                                      <p:cBhvr>
-                                        <p:cTn id="22" dur="1" fill="hold">
-                                          <p:stCondLst>
-                                            <p:cond delay="0"/>
-                                          </p:stCondLst>
-                                        </p:cTn>
-                                        <p:tgtEl>
-                                          <p:spTgt spid="6"/>
-                                        </p:tgtEl>
-                                        <p:attrNameLst>
-                                          <p:attrName>style.visibility</p:attrName>
-                                        </p:attrNameLst>
-                                      </p:cBhvr>
-                                      <p:to>
-                                        <p:strVal val="visible"/>
-                                      </p:to>
-                                    </p:set>
-                                    <p:animEffect transition="in" filter="fade">
-                                      <p:cBhvr>
-                                        <p:cTn id="23" dur="500"/>
-                                        <p:tgtEl>
-                                          <p:spTgt spid="6"/>
-                                        </p:tgtEl>
-                                      </p:cBhvr>
-                                    </p:animEffect>
-                                  </p:childTnLst>
-                                </p:cTn>
-                              </p:par>
-                            </p:childTnLst>
-                          </p:cTn>
-                        </p:par>
-                      </p:childTnLst>
-                    </p:cTn>
-                  </p:par>
-                  <p:par>
-                    <p:cTn id="24" fill="hold">
-                      <p:stCondLst>
-                        <p:cond delay="indefinite"/>
-                      </p:stCondLst>
-                      <p:childTnLst>
-                        <p:par>
-                          <p:cTn id="25" fill="hold">
-                            <p:stCondLst>
-                              <p:cond delay="0"/>
-                            </p:stCondLst>
-                            <p:childTnLst>
-                              <p:par>
-                                <p:cTn id="26" presetID="10" presetClass="entr" presetSubtype="0" fill="hold" grpId="0" nodeType="clickEffect">
-                                  <p:stCondLst>
-                                    <p:cond delay="0"/>
-                                  </p:stCondLst>
-                                  <p:childTnLst>
-                                    <p:set>
-                                      <p:cBhvr>
-                                        <p:cTn id="27" dur="1" fill="hold">
-                                          <p:stCondLst>
-                                            <p:cond delay="0"/>
-                                          </p:stCondLst>
-                                        </p:cTn>
-                                        <p:tgtEl>
-                                          <p:spTgt spid="7"/>
-                                        </p:tgtEl>
-                                        <p:attrNameLst>
-                                          <p:attrName>style.visibility</p:attrName>
-                                        </p:attrNameLst>
-                                      </p:cBhvr>
-                                      <p:to>
-                                        <p:strVal val="visible"/>
-                                      </p:to>
-                                    </p:set>
-                                    <p:animEffect transition="in" filter="fade">
-                                      <p:cBhvr>
-                                        <p:cTn id="28" dur="500"/>
-                                        <p:tgtEl>
-                                          <p:spTgt spid="7"/>
-                                        </p:tgtEl>
-                                      </p:cBhvr>
-                                    </p:animEffect>
-                                  </p:childTnLst>
-                                </p:cTn>
-                              </p:par>
-                              <p:par>
-                                <p:cTn id="29" presetID="10" presetClass="entr" presetSubtype="0" fill="hold" nodeType="withEffect">
-                                  <p:stCondLst>
-                                    <p:cond delay="0"/>
-                                  </p:stCondLst>
-                                  <p:childTnLst>
-                                    <p:set>
-                                      <p:cBhvr>
-                                        <p:cTn id="30" dur="1" fill="hold">
-                                          <p:stCondLst>
-                                            <p:cond delay="0"/>
-                                          </p:stCondLst>
-                                        </p:cTn>
-                                        <p:tgtEl>
-                                          <p:spTgt spid="26"/>
-                                        </p:tgtEl>
-                                        <p:attrNameLst>
-                                          <p:attrName>style.visibility</p:attrName>
-                                        </p:attrNameLst>
-                                      </p:cBhvr>
-                                      <p:to>
-                                        <p:strVal val="visible"/>
-                                      </p:to>
-                                    </p:set>
-                                    <p:animEffect transition="in" filter="fade">
-                                      <p:cBhvr>
-                                        <p:cTn id="31" dur="500"/>
-                                        <p:tgtEl>
-                                          <p:spTgt spid="26"/>
-                                        </p:tgtEl>
-                                      </p:cBhvr>
-                                    </p:animEffect>
-                                  </p:childTnLst>
-                                </p:cTn>
-                              </p:par>
-                            </p:childTnLst>
-                          </p:cTn>
-                        </p:par>
-                      </p:childTnLst>
-                    </p:cTn>
-                  </p:par>
-                  <p:par>
-                    <p:cTn id="32" fill="hold">
-                      <p:stCondLst>
-                        <p:cond delay="indefinite"/>
-                      </p:stCondLst>
-                      <p:childTnLst>
-                        <p:par>
-                          <p:cTn id="33" fill="hold">
-                            <p:stCondLst>
-                              <p:cond delay="0"/>
-                            </p:stCondLst>
-                            <p:childTnLst>
-                              <p:par>
-                                <p:cTn id="34" presetID="10" presetClass="entr" presetSubtype="0" fill="hold" nodeType="clickEffect">
-                                  <p:stCondLst>
-                                    <p:cond delay="0"/>
-                                  </p:stCondLst>
-                                  <p:childTnLst>
-                                    <p:set>
-                                      <p:cBhvr>
-                                        <p:cTn id="35" dur="1" fill="hold">
-                                          <p:stCondLst>
-                                            <p:cond delay="0"/>
-                                          </p:stCondLst>
-                                        </p:cTn>
-                                        <p:tgtEl>
-                                          <p:spTgt spid="17"/>
-                                        </p:tgtEl>
-                                        <p:attrNameLst>
-                                          <p:attrName>style.visibility</p:attrName>
-                                        </p:attrNameLst>
-                                      </p:cBhvr>
-                                      <p:to>
-                                        <p:strVal val="visible"/>
-                                      </p:to>
-                                    </p:set>
-                                    <p:animEffect transition="in" filter="fade">
-                                      <p:cBhvr>
-                                        <p:cTn id="36" dur="500"/>
-                                        <p:tgtEl>
-                                          <p:spTgt spid="17"/>
-                                        </p:tgtEl>
-                                      </p:cBhvr>
-                                    </p:animEffect>
-                                  </p:childTnLst>
-                                </p:cTn>
-                              </p:par>
-                              <p:par>
-                                <p:cTn id="37" presetID="10" presetClass="entr" presetSubtype="0" fill="hold" grpId="0" nodeType="withEffect">
-                                  <p:stCondLst>
-                                    <p:cond delay="0"/>
-                                  </p:stCondLst>
-                                  <p:childTnLst>
-                                    <p:set>
-                                      <p:cBhvr>
-                                        <p:cTn id="38" dur="1" fill="hold">
-                                          <p:stCondLst>
-                                            <p:cond delay="0"/>
-                                          </p:stCondLst>
-                                        </p:cTn>
-                                        <p:tgtEl>
-                                          <p:spTgt spid="9"/>
-                                        </p:tgtEl>
-                                        <p:attrNameLst>
-                                          <p:attrName>style.visibility</p:attrName>
-                                        </p:attrNameLst>
-                                      </p:cBhvr>
-                                      <p:to>
-                                        <p:strVal val="visible"/>
-                                      </p:to>
-                                    </p:set>
-                                    <p:animEffect transition="in" filter="fade">
-                                      <p:cBhvr>
-                                        <p:cTn id="39" dur="500"/>
-                                        <p:tgtEl>
-                                          <p:spTgt spid="9"/>
-                                        </p:tgtEl>
-                                      </p:cBhvr>
-                                    </p:animEffect>
-                                  </p:childTnLst>
-                                </p:cTn>
-                              </p:par>
-                            </p:childTnLst>
-                          </p:cTn>
-                        </p:par>
-                      </p:childTnLst>
-                    </p:cTn>
-                  </p:par>
-                  <p:par>
-                    <p:cTn id="40" fill="hold">
-                      <p:stCondLst>
-                        <p:cond delay="indefinite"/>
-                      </p:stCondLst>
-                      <p:childTnLst>
-                        <p:par>
-                          <p:cTn id="41" fill="hold">
-                            <p:stCondLst>
-                              <p:cond delay="0"/>
-                            </p:stCondLst>
-                            <p:childTnLst>
-                              <p:par>
-                                <p:cTn id="42" presetID="10" presetClass="entr" presetSubtype="0" fill="hold" nodeType="clickEffect">
-                                  <p:stCondLst>
-                                    <p:cond delay="0"/>
-                                  </p:stCondLst>
-                                  <p:childTnLst>
-                                    <p:set>
-                                      <p:cBhvr>
-                                        <p:cTn id="43" dur="1" fill="hold">
-                                          <p:stCondLst>
-                                            <p:cond delay="0"/>
-                                          </p:stCondLst>
-                                        </p:cTn>
-                                        <p:tgtEl>
-                                          <p:spTgt spid="20"/>
-                                        </p:tgtEl>
-                                        <p:attrNameLst>
-                                          <p:attrName>style.visibility</p:attrName>
-                                        </p:attrNameLst>
-                                      </p:cBhvr>
-                                      <p:to>
-                                        <p:strVal val="visible"/>
-                                      </p:to>
-                                    </p:set>
-                                    <p:animEffect transition="in" filter="fade">
-                                      <p:cBhvr>
-                                        <p:cTn id="44" dur="500"/>
-                                        <p:tgtEl>
-                                          <p:spTgt spid="20"/>
                                         </p:tgtEl>
                                       </p:cBhvr>
                                     </p:animEffect>
@@ -4340,7 +4270,7 @@
                                           </p:stCondLst>
                                         </p:cTn>
                                         <p:tgtEl>
-                                          <p:spTgt spid="8"/>
+                                          <p:spTgt spid="6"/>
                                         </p:tgtEl>
                                         <p:attrNameLst>
                                           <p:attrName>style.visibility</p:attrName>
@@ -4354,7 +4284,7 @@
                                       <p:cBhvr>
                                         <p:cTn id="47" dur="500"/>
                                         <p:tgtEl>
-                                          <p:spTgt spid="8"/>
+                                          <p:spTgt spid="6"/>
                                         </p:tgtEl>
                                       </p:cBhvr>
                                     </p:animEffect>
@@ -4393,7 +4323,7 @@
                                           </p:stCondLst>
                                         </p:cTn>
                                         <p:tgtEl>
-                                          <p:spTgt spid="30"/>
+                                          <p:spTgt spid="17"/>
                                         </p:tgtEl>
                                         <p:attrNameLst>
                                           <p:attrName>style.visibility</p:attrName>
@@ -4407,7 +4337,42 @@
                                       <p:cBhvr>
                                         <p:cTn id="52" dur="500"/>
                                         <p:tgtEl>
-                                          <p:spTgt spid="30"/>
+                                          <p:spTgt spid="17"/>
+                                        </p:tgtEl>
+                                      </p:cBhvr>
+                                    </p:animEffect>
+                                  </p:childTnLst>
+                                </p:cTn>
+                              </p:par>
+                              <p:par>
+                                <p:cTn id="53" presetID="10" presetClass="entr" presetSubtype="0" fill="hold" grpId="0" nodeType="withEffect">
+                                  <p:stCondLst>
+                                    <p:cond delay="0"/>
+                                  </p:stCondLst>
+                                  <p:childTnLst>
+                                    <p:set>
+                                      <p:cBhvr>
+                                        <p:cTn id="54" dur="1" fill="hold">
+                                          <p:stCondLst>
+                                            <p:cond delay="0"/>
+                                          </p:stCondLst>
+                                        </p:cTn>
+                                        <p:tgtEl>
+                                          <p:spTgt spid="59"/>
+                                        </p:tgtEl>
+                                        <p:attrNameLst>
+                                          <p:attrName>style.visibility</p:attrName>
+                                        </p:attrNameLst>
+                                      </p:cBhvr>
+                                      <p:to>
+                                        <p:strVal val="visible"/>
+                                      </p:to>
+                                    </p:set>
+                                    <p:animEffect transition="in" filter="fade">
+                                      <p:cBhvr>
+                                        <p:cTn id="55" dur="500"/>
+                                        <p:tgtEl>
+                                          <p:spTgt spid="59"/>
                                         </p:tgtEl>
                                       </p:cBhvr>
                                     </p:animEffect>
@@ -4421,32 +4386,32 @@
                     </p:cTn>
                   </p:par>
                   <p:par>
-                    <p:cTn id="53" fill="hold">
+                    <p:cTn id="56" fill="hold">
                       <p:stCondLst>
                         <p:cond delay="indefinite"/>
                       </p:stCondLst>
                       <p:childTnLst>
                         <p:par>
-                          <p:cTn id="54" fill="hold">
+                          <p:cTn id="57" fill="hold">
                             <p:stCondLst>
                               <p:cond delay="0"/>
                             </p:stCondLst>
                             <p:childTnLst>
                               <p:par>
-                                <p:cTn id="55" presetID="10" presetClass="entr" presetSubtype="0" fill="hold" nodeType="clickEffect">
+                                <p:cTn id="58" presetID="10" presetClass="entr" presetSubtype="0" fill="hold" nodeType="clickEffect">
                                   <p:stCondLst>
                                     <p:cond delay="0"/>
                                   </p:stCondLst>
                                   <p:childTnLst>
                                     <p:set>
                                       <p:cBhvr>
-                                        <p:cTn id="56" dur="1" fill="hold">
+                                        <p:cTn id="59" dur="1" fill="hold">
                                           <p:stCondLst>
                                             <p:cond delay="0"/>
                                           </p:stCondLst>
                                         </p:cTn>
                                         <p:tgtEl>
-                                          <p:spTgt spid="33"/>
+                                          <p:spTgt spid="53"/>
                                         </p:tgtEl>
                                         <p:attrNameLst>
                                           <p:attrName>style.visibility</p:attrName>
@@ -4458,9 +4423,9 @@
                                     </p:set>
                                     <p:animEffect transition="in" filter="fade">
                                       <p:cBhvr>
-                                        <p:cTn id="57" dur="500"/>
+                                        <p:cTn id="60" dur="500"/>
                                         <p:tgtEl>
-                                          <p:spTgt spid="33"/>
+                                          <p:spTgt spid="53"/>
                                         </p:tgtEl>
                                       </p:cBhvr>
                                     </p:animEffect>
@@ -4468,14 +4433,14 @@
                                 </p:cTn>
                               </p:par>
                               <p:par>
-                                <p:cTn id="58" presetID="10" presetClass="entr" presetSubtype="0" fill="hold" grpId="0" nodeType="withEffect">
+                                <p:cTn id="61" presetID="10" presetClass="entr" presetSubtype="0" fill="hold" grpId="0" nodeType="withEffect">
                                   <p:stCondLst>
                                     <p:cond delay="0"/>
                                   </p:stCondLst>
                                   <p:childTnLst>
                                     <p:set>
                                       <p:cBhvr>
-                                        <p:cTn id="59" dur="1" fill="hold">
+                                        <p:cTn id="62" dur="1" fill="hold">
                                           <p:stCondLst>
                                             <p:cond delay="0"/>
                                           </p:stCondLst>
@@ -4493,7 +4458,7 @@
                                     </p:set>
                                     <p:animEffect transition="in" filter="fade">
                                       <p:cBhvr>
-                                        <p:cTn id="60" dur="500"/>
+                                        <p:cTn id="63" dur="500"/>
                                         <p:tgtEl>
                                           <p:spTgt spid="10"/>
                                         </p:tgtEl>
@@ -4509,32 +4474,32 @@
                     </p:cTn>
                   </p:par>
                   <p:par>
-                    <p:cTn id="61" fill="hold">
+                    <p:cTn id="64" fill="hold">
                       <p:stCondLst>
                         <p:cond delay="indefinite"/>
                       </p:stCondLst>
                       <p:childTnLst>
                         <p:par>
-                          <p:cTn id="62" fill="hold">
+                          <p:cTn id="65" fill="hold">
                             <p:stCondLst>
                               <p:cond delay="0"/>
                             </p:stCondLst>
                             <p:childTnLst>
                               <p:par>
-                                <p:cTn id="63" presetID="10" presetClass="entr" presetSubtype="0" fill="hold" nodeType="clickEffect">
+                                <p:cTn id="66" presetID="10" presetClass="entr" presetSubtype="0" fill="hold" nodeType="clickEffect">
                                   <p:stCondLst>
                                     <p:cond delay="0"/>
                                   </p:stCondLst>
                                   <p:childTnLst>
                                     <p:set>
                                       <p:cBhvr>
-                                        <p:cTn id="64" dur="1" fill="hold">
+                                        <p:cTn id="67" dur="1" fill="hold">
                                           <p:stCondLst>
                                             <p:cond delay="0"/>
                                           </p:stCondLst>
                                         </p:cTn>
                                         <p:tgtEl>
-                                          <p:spTgt spid="46"/>
+                                          <p:spTgt spid="30"/>
                                         </p:tgtEl>
                                         <p:attrNameLst>
                                           <p:attrName>style.visibility</p:attrName>
@@ -4546,9 +4511,9 @@
                                     </p:set>
                                     <p:animEffect transition="in" filter="fade">
                                       <p:cBhvr>
-                                        <p:cTn id="65" dur="500"/>
+                                        <p:cTn id="68" dur="500"/>
                                         <p:tgtEl>
-                                          <p:spTgt spid="46"/>
+                                          <p:spTgt spid="30"/>
                                         </p:tgtEl>
                                       </p:cBhvr>
                                     </p:animEffect>
@@ -4556,14 +4521,14 @@
                                 </p:cTn>
                               </p:par>
                               <p:par>
-                                <p:cTn id="66" presetID="10" presetClass="entr" presetSubtype="0" fill="hold" grpId="0" nodeType="withEffect">
+                                <p:cTn id="69" presetID="10" presetClass="entr" presetSubtype="0" fill="hold" grpId="0" nodeType="withEffect">
                                   <p:stCondLst>
                                     <p:cond delay="0"/>
                                   </p:stCondLst>
                                   <p:childTnLst>
                                     <p:set>
                                       <p:cBhvr>
-                                        <p:cTn id="67" dur="1" fill="hold">
+                                        <p:cTn id="70" dur="1" fill="hold">
                                           <p:stCondLst>
                                             <p:cond delay="0"/>
                                           </p:stCondLst>
@@ -4581,7 +4546,7 @@
                                     </p:set>
                                     <p:animEffect transition="in" filter="fade">
                                       <p:cBhvr>
-                                        <p:cTn id="68" dur="500"/>
+                                        <p:cTn id="71" dur="500"/>
                                         <p:tgtEl>
                                           <p:spTgt spid="12"/>
                                         </p:tgtEl>
@@ -4597,54 +4562,19 @@
                     </p:cTn>
                   </p:par>
                   <p:par>
-                    <p:cTn id="69" fill="hold">
+                    <p:cTn id="72" fill="hold">
                       <p:stCondLst>
                         <p:cond delay="indefinite"/>
                       </p:stCondLst>
                       <p:childTnLst>
                         <p:par>
-                          <p:cTn id="70" fill="hold">
+                          <p:cTn id="73" fill="hold">
                             <p:stCondLst>
                               <p:cond delay="0"/>
                             </p:stCondLst>
                             <p:childTnLst>
                               <p:par>
-                                <p:cTn id="71" presetID="10" presetClass="entr" presetSubtype="0" fill="hold" nodeType="clickEffect">
-                                  <p:stCondLst>
-                                    <p:cond delay="0"/>
-                                  </p:stCondLst>
-                                  <p:childTnLst>
-                                    <p:set>
-                                      <p:cBhvr>
-                                        <p:cTn id="72" dur="1" fill="hold">
-                                          <p:stCondLst>
-                                            <p:cond delay="0"/>
-                                          </p:stCondLst>
-                                        </p:cTn>
-                                        <p:tgtEl>
-                                          <p:spTgt spid="38"/>
-                                        </p:tgtEl>
-                                        <p:attrNameLst>
-                                          <p:attrName>style.visibility</p:attrName>
-                                        </p:attrNameLst>
-                                      </p:cBhvr>
-                                      <p:to>
-                                        <p:strVal val="visible"/>
-                                      </p:to>
-                                    </p:set>
-                                    <p:animEffect transition="in" filter="fade">
-                                      <p:cBhvr>
-                                        <p:cTn id="73" dur="500"/>
-                                        <p:tgtEl>
-                                          <p:spTgt spid="38"/>
-                                        </p:tgtEl>
-                                      </p:cBhvr>
-                                    </p:animEffect>
-                                  </p:childTnLst>
-                                </p:cTn>
-                              </p:par>
-                              <p:par>
-                                <p:cTn id="74" presetID="10" presetClass="entr" presetSubtype="0" fill="hold" grpId="0" nodeType="withEffect">
+                                <p:cTn id="74" presetID="10" presetClass="entr" presetSubtype="0" fill="hold" nodeType="clickEffect">
                                   <p:stCondLst>
                                     <p:cond delay="0"/>
                                   </p:stCondLst>
@@ -4657,7 +4587,7 @@
                                           </p:stCondLst>
                                         </p:cTn>
                                         <p:tgtEl>
-                                          <p:spTgt spid="62"/>
+                                          <p:spTgt spid="94"/>
                                         </p:tgtEl>
                                         <p:attrNameLst>
                                           <p:attrName>style.visibility</p:attrName>
@@ -4671,60 +4601,7 @@
                                       <p:cBhvr>
                                         <p:cTn id="76" dur="500"/>
                                         <p:tgtEl>
-                                          <p:spTgt spid="62"/>
-                                        </p:tgtEl>
-                                      </p:cBhvr>
-                                    </p:animEffect>
-                                  </p:childTnLst>
-                                </p:cTn>
-                              </p:par>
-                            </p:childTnLst>
-                          </p:cTn>
-                        </p:par>
-                      </p:childTnLst>
-                    </p:cTn>
-                  </p:par>
-                  <p:par>
-                    <p:cTn id="77" fill="hold">
-                      <p:stCondLst>
-                        <p:cond delay="indefinite"/>
-                      </p:stCondLst>
-                      <p:childTnLst>
-                        <p:par>
-                          <p:cTn id="78" fill="hold">
-                            <p:stCondLst>
-                              <p:cond delay="0"/>
-                            </p:stCondLst>
-                            <p:childTnLst>
-                              <p:par>
-                                <p:cTn id="79" presetID="10" presetClass="entr" presetSubtype="0" fill="hold" grpId="0" nodeType="clickEffect">
-                                  <p:stCondLst>
-                                    <p:cond delay="0"/>
-                                  </p:stCondLst>
-                                  <p:childTnLst>
-                                    <p:set>
-                                      <p:cBhvr>
-                                        <p:cTn id="80" dur="1" fill="hold">
-                                          <p:stCondLst>
-                                            <p:cond delay="0"/>
-                                          </p:stCondLst>
-                                        </p:cTn>
-                                        <p:tgtEl>
-                                          <p:spTgt spid="76"/>
-                                        </p:tgtEl>
-                                        <p:attrNameLst>
-                                          <p:attrName>style.visibility</p:attrName>
-                                        </p:attrNameLst>
-                                      </p:cBhvr>
-                                      <p:to>
-                                        <p:strVal val="visible"/>
-                                      </p:to>
-                                    </p:set>
-                                    <p:animEffect transition="in" filter="fade">
-                                      <p:cBhvr>
-                                        <p:cTn id="81" dur="500"/>
-                                        <p:tgtEl>
-                                          <p:spTgt spid="76"/>
+                                          <p:spTgt spid="94"/>
                                         </p:tgtEl>
                                       </p:cBhvr>
                                     </p:animEffect>
@@ -4732,102 +4609,14 @@
                                 </p:cTn>
                               </p:par>
                               <p:par>
-                                <p:cTn id="82" presetID="10" presetClass="entr" presetSubtype="0" fill="hold" nodeType="withEffect">
+                                <p:cTn id="77" presetID="10" presetClass="entr" presetSubtype="0" fill="hold" grpId="0" nodeType="withEffect">
                                   <p:stCondLst>
                                     <p:cond delay="0"/>
                                   </p:stCondLst>
                                   <p:childTnLst>
                                     <p:set>
                                       <p:cBhvr>
-                                        <p:cTn id="83" dur="1" fill="hold">
-                                          <p:stCondLst>
-                                            <p:cond delay="0"/>
-                                          </p:stCondLst>
-                                        </p:cTn>
-                                        <p:tgtEl>
-                                          <p:spTgt spid="78"/>
-                                        </p:tgtEl>
-                                        <p:attrNameLst>
-                                          <p:attrName>style.visibility</p:attrName>
-                                        </p:attrNameLst>
-                                      </p:cBhvr>
-                                      <p:to>
-                                        <p:strVal val="visible"/>
-                                      </p:to>
-                                    </p:set>
-                                    <p:animEffect transition="in" filter="fade">
-                                      <p:cBhvr>
-                                        <p:cTn id="84" dur="500"/>
-                                        <p:tgtEl>
-                                          <p:spTgt spid="78"/>
-                                        </p:tgtEl>
-                                      </p:cBhvr>
-                                    </p:animEffect>
-                                  </p:childTnLst>
-                                </p:cTn>
-                              </p:par>
-                              <p:par>
-                                <p:cTn id="85" presetID="10" presetClass="entr" presetSubtype="0" fill="hold" nodeType="withEffect">
-                                  <p:stCondLst>
-                                    <p:cond delay="0"/>
-                                  </p:stCondLst>
-                                  <p:childTnLst>
-                                    <p:set>
-                                      <p:cBhvr>
-                                        <p:cTn id="86" dur="1" fill="hold">
-                                          <p:stCondLst>
-                                            <p:cond delay="0"/>
-                                          </p:stCondLst>
-                                        </p:cTn>
-                                        <p:tgtEl>
-                                          <p:spTgt spid="82"/>
-                                        </p:tgtEl>
-                                        <p:attrNameLst>
-                                          <p:attrName>style.visibility</p:attrName>
-                                        </p:attrNameLst>
-                                      </p:cBhvr>
-                                      <p:to>
-                                        <p:strVal val="visible"/>
-                                      </p:to>
-                                    </p:set>
-                                    <p:animEffect transition="in" filter="fade">
-                                      <p:cBhvr>
-                                        <p:cTn id="87" dur="500"/>
-                                        <p:tgtEl>
-                                          <p:spTgt spid="82"/>
-                                        </p:tgtEl>
-                                      </p:cBhvr>
-                                    </p:animEffect>
-                                  </p:childTnLst>
-                                </p:cTn>
-                              </p:par>
-                            </p:childTnLst>
-                          </p:cTn>
-                        </p:par>
-                      </p:childTnLst>
-                    </p:cTn>
-                  </p:par>
-                  <p:par>
-                    <p:cTn id="88" fill="hold">
-                      <p:stCondLst>
-                        <p:cond delay="indefinite"/>
-                      </p:stCondLst>
-                      <p:childTnLst>
-                        <p:par>
-                          <p:cTn id="89" fill="hold">
-                            <p:stCondLst>
-                              <p:cond delay="0"/>
-                            </p:stCondLst>
-                            <p:childTnLst>
-                              <p:par>
-                                <p:cTn id="90" presetID="10" presetClass="entr" presetSubtype="0" fill="hold" grpId="0" nodeType="clickEffect">
-                                  <p:stCondLst>
-                                    <p:cond delay="0"/>
-                                  </p:stCondLst>
-                                  <p:childTnLst>
-                                    <p:set>
-                                      <p:cBhvr>
-                                        <p:cTn id="91" dur="1" fill="hold">
+                                        <p:cTn id="78" dur="1" fill="hold">
                                           <p:stCondLst>
                                             <p:cond delay="0"/>
                                           </p:stCondLst>
@@ -4845,7 +4634,7 @@
                                     </p:set>
                                     <p:animEffect transition="in" filter="fade">
                                       <p:cBhvr>
-                                        <p:cTn id="92" dur="500"/>
+                                        <p:cTn id="79" dur="500"/>
                                         <p:tgtEl>
                                           <p:spTgt spid="77"/>
                                         </p:tgtEl>
@@ -4882,16 +4671,15 @@
       </p:par>
     </p:tnLst>
     <p:bldLst>
+      <p:bldP spid="63" grpId="0" animBg="1"/>
       <p:bldP spid="4" grpId="0" animBg="1"/>
       <p:bldP spid="5" grpId="0" animBg="1"/>
       <p:bldP spid="6" grpId="0" animBg="1"/>
       <p:bldP spid="7" grpId="0" animBg="1"/>
-      <p:bldP spid="8" grpId="0" animBg="1"/>
       <p:bldP spid="9" grpId="0" animBg="1"/>
       <p:bldP spid="10" grpId="0" animBg="1"/>
       <p:bldP spid="12" grpId="0" animBg="1"/>
-      <p:bldP spid="62" grpId="0" animBg="1"/>
-      <p:bldP spid="76" grpId="0" animBg="1"/>
+      <p:bldP spid="59" grpId="0" animBg="1"/>
       <p:bldP spid="77" grpId="0" animBg="1"/>
     </p:bldLst>
   </p:timing>

</xml_diff>